<commit_message>
change line color to red
</commit_message>
<xml_diff>
--- a/luna_authoring_system/test/test_assets/Empty slide with slideLayout.pptx
+++ b/luna_authoring_system/test/test_assets/Empty slide with slideLayout.pptx
@@ -261,7 +261,7 @@
       <p15:notesGuideLst xmlns:p15="http://schemas.microsoft.com/office/powerpoint/2012/main"/>
     </p:ext>
     <p:ext uri="GoogleSlidesCustomDataVersion2">
-      <go:slidesCustomData xmlns:go="http://customooxmlschemas.google.com/" xmlns:ahyp="http://schemas.microsoft.com/office/drawing/2018/hyperlinkcolor" xmlns:p15="http://schemas.microsoft.com/office/powerpoint/2012/main" xmlns:p14="http://schemas.microsoft.com/office/powerpoint/2010/main" xmlns:com="http://schemas.openxmlformats.org/drawingml/2006/compatibility" xmlns:pvml="urn:schemas-microsoft-com:office:powerpoint" xmlns:v="urn:schemas-microsoft-com:vml" xmlns:o="urn:schemas-microsoft-com:office:office" xmlns:dgm="http://schemas.openxmlformats.org/drawingml/2006/diagram" xmlns:c="http://schemas.openxmlformats.org/drawingml/2006/chart" xmlns:mv="urn:schemas-microsoft-com:mac:vml" xmlns:mc="http://schemas.openxmlformats.org/markup-compatibility/2006" xmlns="" r:id="rId88" roundtripDataSignature="AMtx7mj+HxEERLloKJCJZXYw/la0JCzbug=="/>
+      <go:slidesCustomData xmlns="" xmlns:mc="http://schemas.openxmlformats.org/markup-compatibility/2006" xmlns:mv="urn:schemas-microsoft-com:mac:vml" xmlns:c="http://schemas.openxmlformats.org/drawingml/2006/chart" xmlns:dgm="http://schemas.openxmlformats.org/drawingml/2006/diagram" xmlns:o="urn:schemas-microsoft-com:office:office" xmlns:v="urn:schemas-microsoft-com:vml" xmlns:pvml="urn:schemas-microsoft-com:office:powerpoint" xmlns:com="http://schemas.openxmlformats.org/drawingml/2006/compatibility" xmlns:p14="http://schemas.microsoft.com/office/powerpoint/2010/main" xmlns:p15="http://schemas.microsoft.com/office/powerpoint/2012/main" xmlns:ahyp="http://schemas.microsoft.com/office/drawing/2018/hyperlinkcolor" xmlns:go="http://customooxmlschemas.google.com/" r:id="rId88" roundtripDataSignature="AMtx7mj+HxEERLloKJCJZXYw/la0JCzbug=="/>
     </p:ext>
   </p:extLst>
 </p:presentation>
@@ -4234,6 +4234,54 @@
       </p:grpSpPr>
       <p:sp>
         <p:nvSpPr>
+          <p:cNvPr id="10" name="Text Placeholder 9">
+            <a:extLst>
+              <a:ext uri="{FF2B5EF4-FFF2-40B4-BE49-F238E27FC236}">
+                <a16:creationId xmlns:a16="http://schemas.microsoft.com/office/drawing/2014/main" id="{32261197-84A5-6E45-32B3-3FEB8A6A7B69}"/>
+              </a:ext>
+            </a:extLst>
+          </p:cNvPr>
+          <p:cNvSpPr>
+            <a:spLocks noGrp="1"/>
+          </p:cNvSpPr>
+          <p:nvPr>
+            <p:ph type="body" sz="quarter" idx="13" hasCustomPrompt="1"/>
+          </p:nvPr>
+        </p:nvSpPr>
+        <p:spPr>
+          <a:xfrm>
+            <a:off x="177800" y="274638"/>
+            <a:ext cx="3754438" cy="369887"/>
+          </a:xfrm>
+          <a:prstGeom prst="rect">
+            <a:avLst/>
+          </a:prstGeom>
+        </p:spPr>
+        <p:txBody>
+          <a:bodyPr>
+            <a:normAutofit/>
+          </a:bodyPr>
+          <a:lstStyle>
+            <a:lvl1pPr marL="0" indent="0" algn="ctr">
+              <a:buNone/>
+              <a:defRPr b="1">
+                <a:solidFill>
+                  <a:srgbClr val="0070C0"/>
+                </a:solidFill>
+              </a:defRPr>
+            </a:lvl1pPr>
+          </a:lstStyle>
+          <a:p>
+            <a:pPr lvl="0"/>
+            <a:r>
+              <a:rPr lang="en-US" dirty="0"/>
+              <a:t>Click to add title</a:t>
+            </a:r>
+          </a:p>
+        </p:txBody>
+      </p:sp>
+      <p:sp>
+        <p:nvSpPr>
           <p:cNvPr id="11" name="Text Placeholder 10">
             <a:extLst>
               <a:ext uri="{FF2B5EF4-FFF2-40B4-BE49-F238E27FC236}">
@@ -4298,7 +4346,7 @@
           </a:prstGeom>
           <a:ln w="19050">
             <a:solidFill>
-              <a:srgbClr val="0070C0"/>
+              <a:srgbClr val="FF0000"/>
             </a:solidFill>
           </a:ln>
         </p:spPr>
@@ -4383,7 +4431,7 @@
           </a:prstGeom>
           <a:ln w="19050">
             <a:solidFill>
-              <a:srgbClr val="0070C0"/>
+              <a:srgbClr val="FF0000"/>
             </a:solidFill>
           </a:ln>
         </p:spPr>
@@ -4402,54 +4450,6 @@
           </a:fontRef>
         </p:style>
       </p:cxnSp>
-      <p:sp>
-        <p:nvSpPr>
-          <p:cNvPr id="10" name="Text Placeholder 9">
-            <a:extLst>
-              <a:ext uri="{FF2B5EF4-FFF2-40B4-BE49-F238E27FC236}">
-                <a16:creationId xmlns:a16="http://schemas.microsoft.com/office/drawing/2014/main" id="{32261197-84A5-6E45-32B3-3FEB8A6A7B69}"/>
-              </a:ext>
-            </a:extLst>
-          </p:cNvPr>
-          <p:cNvSpPr>
-            <a:spLocks noGrp="1"/>
-          </p:cNvSpPr>
-          <p:nvPr>
-            <p:ph type="body" sz="quarter" idx="13" hasCustomPrompt="1"/>
-          </p:nvPr>
-        </p:nvSpPr>
-        <p:spPr>
-          <a:xfrm>
-            <a:off x="177800" y="274638"/>
-            <a:ext cx="3754438" cy="369887"/>
-          </a:xfrm>
-          <a:prstGeom prst="rect">
-            <a:avLst/>
-          </a:prstGeom>
-        </p:spPr>
-        <p:txBody>
-          <a:bodyPr>
-            <a:normAutofit/>
-          </a:bodyPr>
-          <a:lstStyle>
-            <a:lvl1pPr marL="0" indent="0" algn="ctr">
-              <a:buNone/>
-              <a:defRPr b="1">
-                <a:solidFill>
-                  <a:srgbClr val="0070C0"/>
-                </a:solidFill>
-              </a:defRPr>
-            </a:lvl1pPr>
-          </a:lstStyle>
-          <a:p>
-            <a:pPr lvl="0"/>
-            <a:r>
-              <a:rPr lang="en-US" dirty="0"/>
-              <a:t>Click to add title</a:t>
-            </a:r>
-          </a:p>
-        </p:txBody>
-      </p:sp>
     </p:spTree>
     <p:extLst>
       <p:ext uri="{BB962C8B-B14F-4D97-AF65-F5344CB8AC3E}">

</xml_diff>